<commit_message>
update HRF, warnings according to logs
</commit_message>
<xml_diff>
--- a/hrf/kidnapping.pptx
+++ b/hrf/kidnapping.pptx
@@ -267,7 +267,7 @@
           <a:p>
             <a:fld id="{30A6047E-43F2-DB44-9500-0B7A69155C07}" type="datetimeFigureOut">
               <a:rPr lang="en-US" smtClean="0"/>
-              <a:t>2/3/22</a:t>
+              <a:t>2/7/22</a:t>
             </a:fld>
             <a:endParaRPr lang="en-US"/>
           </a:p>
@@ -465,7 +465,7 @@
           <a:p>
             <a:fld id="{30A6047E-43F2-DB44-9500-0B7A69155C07}" type="datetimeFigureOut">
               <a:rPr lang="en-US" smtClean="0"/>
-              <a:t>2/3/22</a:t>
+              <a:t>2/7/22</a:t>
             </a:fld>
             <a:endParaRPr lang="en-US"/>
           </a:p>
@@ -673,7 +673,7 @@
           <a:p>
             <a:fld id="{30A6047E-43F2-DB44-9500-0B7A69155C07}" type="datetimeFigureOut">
               <a:rPr lang="en-US" smtClean="0"/>
-              <a:t>2/3/22</a:t>
+              <a:t>2/7/22</a:t>
             </a:fld>
             <a:endParaRPr lang="en-US"/>
           </a:p>
@@ -871,7 +871,7 @@
           <a:p>
             <a:fld id="{30A6047E-43F2-DB44-9500-0B7A69155C07}" type="datetimeFigureOut">
               <a:rPr lang="en-US" smtClean="0"/>
-              <a:t>2/3/22</a:t>
+              <a:t>2/7/22</a:t>
             </a:fld>
             <a:endParaRPr lang="en-US"/>
           </a:p>
@@ -1146,7 +1146,7 @@
           <a:p>
             <a:fld id="{30A6047E-43F2-DB44-9500-0B7A69155C07}" type="datetimeFigureOut">
               <a:rPr lang="en-US" smtClean="0"/>
-              <a:t>2/3/22</a:t>
+              <a:t>2/7/22</a:t>
             </a:fld>
             <a:endParaRPr lang="en-US"/>
           </a:p>
@@ -1411,7 +1411,7 @@
           <a:p>
             <a:fld id="{30A6047E-43F2-DB44-9500-0B7A69155C07}" type="datetimeFigureOut">
               <a:rPr lang="en-US" smtClean="0"/>
-              <a:t>2/3/22</a:t>
+              <a:t>2/7/22</a:t>
             </a:fld>
             <a:endParaRPr lang="en-US"/>
           </a:p>
@@ -1823,7 +1823,7 @@
           <a:p>
             <a:fld id="{30A6047E-43F2-DB44-9500-0B7A69155C07}" type="datetimeFigureOut">
               <a:rPr lang="en-US" smtClean="0"/>
-              <a:t>2/3/22</a:t>
+              <a:t>2/7/22</a:t>
             </a:fld>
             <a:endParaRPr lang="en-US"/>
           </a:p>
@@ -1964,7 +1964,7 @@
           <a:p>
             <a:fld id="{30A6047E-43F2-DB44-9500-0B7A69155C07}" type="datetimeFigureOut">
               <a:rPr lang="en-US" smtClean="0"/>
-              <a:t>2/3/22</a:t>
+              <a:t>2/7/22</a:t>
             </a:fld>
             <a:endParaRPr lang="en-US"/>
           </a:p>
@@ -2077,7 +2077,7 @@
           <a:p>
             <a:fld id="{30A6047E-43F2-DB44-9500-0B7A69155C07}" type="datetimeFigureOut">
               <a:rPr lang="en-US" smtClean="0"/>
-              <a:t>2/3/22</a:t>
+              <a:t>2/7/22</a:t>
             </a:fld>
             <a:endParaRPr lang="en-US"/>
           </a:p>
@@ -2388,7 +2388,7 @@
           <a:p>
             <a:fld id="{30A6047E-43F2-DB44-9500-0B7A69155C07}" type="datetimeFigureOut">
               <a:rPr lang="en-US" smtClean="0"/>
-              <a:t>2/3/22</a:t>
+              <a:t>2/7/22</a:t>
             </a:fld>
             <a:endParaRPr lang="en-US"/>
           </a:p>
@@ -2676,7 +2676,7 @@
           <a:p>
             <a:fld id="{30A6047E-43F2-DB44-9500-0B7A69155C07}" type="datetimeFigureOut">
               <a:rPr lang="en-US" smtClean="0"/>
-              <a:t>2/3/22</a:t>
+              <a:t>2/7/22</a:t>
             </a:fld>
             <a:endParaRPr lang="en-US"/>
           </a:p>
@@ -2917,7 +2917,7 @@
           <a:p>
             <a:fld id="{30A6047E-43F2-DB44-9500-0B7A69155C07}" type="datetimeFigureOut">
               <a:rPr lang="en-US" smtClean="0"/>
-              <a:t>2/3/22</a:t>
+              <a:t>2/7/22</a:t>
             </a:fld>
             <a:endParaRPr lang="en-US"/>
           </a:p>
@@ -3636,17 +3636,19 @@
         </p:nvSpPr>
         <p:spPr>
           <a:xfrm>
-            <a:off x="839787" y="783021"/>
-            <a:ext cx="3932237" cy="961697"/>
+            <a:off x="156117" y="783021"/>
+            <a:ext cx="4493943" cy="961697"/>
           </a:xfrm>
         </p:spPr>
         <p:txBody>
-          <a:bodyPr/>
+          <a:bodyPr>
+            <a:normAutofit fontScale="90000"/>
+          </a:bodyPr>
           <a:lstStyle/>
           <a:p>
             <a:r>
               <a:rPr lang="en-US" dirty="0"/>
-              <a:t>Contributory factors</a:t>
+              <a:t>Contributory factors (10219)</a:t>
             </a:r>
           </a:p>
         </p:txBody>
@@ -3674,24 +3676,11 @@
           <a:p>
             <a:r>
               <a:rPr lang="en-US" b="1" dirty="0"/>
-              <a:t>Revenge</a:t>
+              <a:t>Revenge </a:t>
             </a:r>
             <a:r>
               <a:rPr lang="en-US" dirty="0"/>
-              <a:t>: harmful action in response to a grievance</a:t>
-            </a:r>
-          </a:p>
-          <a:p>
-            <a:endParaRPr lang="en-US" dirty="0"/>
-          </a:p>
-          <a:p>
-            <a:r>
-              <a:rPr lang="en-US" b="1" dirty="0"/>
-              <a:t>Earnings and losses</a:t>
-            </a:r>
-            <a:r>
-              <a:rPr lang="en-US" dirty="0"/>
-              <a:t>: consumption and savings opportunity gained by an entity within a specified timeframe</a:t>
+              <a:t>(10228): harmful action in response to a grievance</a:t>
             </a:r>
           </a:p>
           <a:p>
@@ -3704,7 +3693,7 @@
             </a:r>
             <a:r>
               <a:rPr lang="en-US" dirty="0"/>
-              <a:t>: preventative measure taken to ensure someone's health</a:t>
+              <a:t> (10229): preventative measure taken to ensure someone's health</a:t>
             </a:r>
           </a:p>
           <a:p>
@@ -3713,11 +3702,24 @@
           <a:p>
             <a:r>
               <a:rPr lang="en-US" b="1" dirty="0"/>
-              <a:t>Quarreling</a:t>
+              <a:t>Quarreling </a:t>
             </a:r>
             <a:r>
               <a:rPr lang="en-US" dirty="0"/>
-              <a:t>: struggle for agency or power in society</a:t>
+              <a:t>(10227): struggle for agency or power in society</a:t>
+            </a:r>
+          </a:p>
+          <a:p>
+            <a:endParaRPr lang="en-US" dirty="0"/>
+          </a:p>
+          <a:p>
+            <a:r>
+              <a:rPr lang="en-US" b="1" dirty="0"/>
+              <a:t>Earnings and losses </a:t>
+            </a:r>
+            <a:r>
+              <a:rPr lang="en-US" dirty="0"/>
+              <a:t>(10226): consumption and savings opportunity gained by an entity within a specified timeframe</a:t>
             </a:r>
           </a:p>
         </p:txBody>
@@ -3810,7 +3812,7 @@
           <a:p>
             <a:r>
               <a:rPr lang="en-US" dirty="0"/>
-              <a:t>Planning</a:t>
+              <a:t>Planning (10220)</a:t>
             </a:r>
           </a:p>
         </p:txBody>
@@ -3833,13 +3835,13 @@
         </p:nvSpPr>
         <p:spPr>
           <a:xfrm>
-            <a:off x="639763" y="803273"/>
-            <a:ext cx="4266774" cy="5340352"/>
+            <a:off x="547909" y="803274"/>
+            <a:ext cx="4113302" cy="5340352"/>
           </a:xfrm>
         </p:spPr>
         <p:txBody>
           <a:bodyPr>
-            <a:normAutofit lnSpcReduction="10000"/>
+            <a:normAutofit fontScale="92500"/>
           </a:bodyPr>
           <a:lstStyle/>
           <a:p>
@@ -3849,7 +3851,15 @@
             </a:r>
             <a:r>
               <a:rPr lang="en-US" dirty="0"/>
-              <a:t>: act of selecting one or more victims</a:t>
+              <a:t> (10230)</a:t>
+            </a:r>
+            <a:r>
+              <a:rPr lang="en-US" b="1" dirty="0"/>
+              <a:t>: </a:t>
+            </a:r>
+            <a:r>
+              <a:rPr lang="en-US" dirty="0"/>
+              <a:t>act of selecting one or more victims</a:t>
             </a:r>
           </a:p>
           <a:p>
@@ -3859,17 +3869,27 @@
             </a:r>
             <a:r>
               <a:rPr lang="en-US" dirty="0"/>
-              <a:t>: act of selecting location where to kidnap victim</a:t>
+              <a:t> (10231): act of selecting location where to kidnap victim</a:t>
             </a:r>
           </a:p>
           <a:p>
             <a:r>
               <a:rPr lang="en-US" b="1" dirty="0"/>
-              <a:t>Cause to be included guards</a:t>
+              <a:t>Deciding communication protocols </a:t>
             </a:r>
             <a:r>
               <a:rPr lang="en-US" dirty="0"/>
-              <a:t>: employment of personnel needed to guard victim</a:t>
+              <a:t>(10233): deliberation about how kidnappers should communicate before, during, and after the crime</a:t>
+            </a:r>
+          </a:p>
+          <a:p>
+            <a:r>
+              <a:rPr lang="en-US" b="1" dirty="0"/>
+              <a:t>Getting tools </a:t>
+            </a:r>
+            <a:r>
+              <a:rPr lang="en-US" dirty="0"/>
+              <a:t>(10234): purchase of tools necessary for crime</a:t>
             </a:r>
           </a:p>
           <a:p>
@@ -3879,7 +3899,37 @@
             </a:r>
             <a:r>
               <a:rPr lang="en-US" dirty="0"/>
-              <a:t>: purchase of weapons needed for crime</a:t>
+              <a:t> (10236): purchase of weapons needed for crime</a:t>
+            </a:r>
+          </a:p>
+          <a:p>
+            <a:r>
+              <a:rPr lang="en-US" b="1" dirty="0"/>
+              <a:t>Cause to be included guards </a:t>
+            </a:r>
+            <a:r>
+              <a:rPr lang="en-US" dirty="0"/>
+              <a:t>(10238): employment of personnel needed to guard victim</a:t>
+            </a:r>
+          </a:p>
+          <a:p>
+            <a:r>
+              <a:rPr lang="en-US" b="1" dirty="0"/>
+              <a:t>Getting vehicle </a:t>
+            </a:r>
+            <a:r>
+              <a:rPr lang="en-US" dirty="0"/>
+              <a:t>(10235): purchase of vehicle needed for crime</a:t>
+            </a:r>
+          </a:p>
+          <a:p>
+            <a:r>
+              <a:rPr lang="en-US" b="1" dirty="0"/>
+              <a:t>Choosing method </a:t>
+            </a:r>
+            <a:r>
+              <a:rPr lang="en-US" dirty="0"/>
+              <a:t>(10232): act of judging the merits of multiple kidnapping methods and selecting one or more of them</a:t>
             </a:r>
           </a:p>
           <a:p>
@@ -3889,47 +3939,7 @@
             </a:r>
             <a:r>
               <a:rPr lang="en-US" dirty="0"/>
-              <a:t>: acquisition of location where victim will stay</a:t>
-            </a:r>
-          </a:p>
-          <a:p>
-            <a:r>
-              <a:rPr lang="en-US" b="1" dirty="0"/>
-              <a:t>Deciding communication protocols</a:t>
-            </a:r>
-            <a:r>
-              <a:rPr lang="en-US" dirty="0"/>
-              <a:t>: deliberation about how kidnappers should communicate before, during, and after the crime</a:t>
-            </a:r>
-          </a:p>
-          <a:p>
-            <a:r>
-              <a:rPr lang="en-US" b="1" dirty="0"/>
-              <a:t>Getting tools</a:t>
-            </a:r>
-            <a:r>
-              <a:rPr lang="en-US" dirty="0"/>
-              <a:t>: purchase of tools necessary for crime</a:t>
-            </a:r>
-          </a:p>
-          <a:p>
-            <a:r>
-              <a:rPr lang="en-US" b="1" dirty="0"/>
-              <a:t>Choosing method</a:t>
-            </a:r>
-            <a:r>
-              <a:rPr lang="en-US" dirty="0"/>
-              <a:t>: act of judging the merits of multiple kidnapping methods and selecting one or more of them</a:t>
-            </a:r>
-          </a:p>
-          <a:p>
-            <a:r>
-              <a:rPr lang="en-US" b="1" dirty="0"/>
-              <a:t>Getting vehicle</a:t>
-            </a:r>
-            <a:r>
-              <a:rPr lang="en-US" dirty="0"/>
-              <a:t>: purchase of vehicle needed for crime</a:t>
+              <a:t> (10237): acquisition of location where victim will stay</a:t>
             </a:r>
           </a:p>
         </p:txBody>
@@ -4012,17 +4022,19 @@
         </p:nvSpPr>
         <p:spPr>
           <a:xfrm>
-            <a:off x="439738" y="457200"/>
-            <a:ext cx="3932237" cy="531812"/>
+            <a:off x="336570" y="1025912"/>
+            <a:ext cx="2069286" cy="531812"/>
           </a:xfrm>
         </p:spPr>
         <p:txBody>
-          <a:bodyPr/>
+          <a:bodyPr>
+            <a:normAutofit fontScale="90000"/>
+          </a:bodyPr>
           <a:lstStyle/>
           <a:p>
             <a:r>
               <a:rPr lang="en-US" b="1" dirty="0"/>
-              <a:t>Scrutiny</a:t>
+              <a:t>Scrutiny (10221)</a:t>
             </a:r>
           </a:p>
         </p:txBody>
@@ -4059,27 +4071,27 @@
             </a:r>
             <a:r>
               <a:rPr lang="en-US" dirty="0"/>
-              <a:t>: monitor of behavior, activities, or other changing information about victim</a:t>
+              <a:t> (10239): monitor of behavior, activities, or other changing information about victim</a:t>
             </a:r>
           </a:p>
           <a:p>
             <a:r>
               <a:rPr lang="en-US" b="1" dirty="0"/>
-              <a:t>Know perception active</a:t>
+              <a:t>Know perception active </a:t>
             </a:r>
             <a:r>
               <a:rPr lang="en-US" dirty="0"/>
-              <a:t>: mental process; act of recognizing attributes of victim</a:t>
+              <a:t>(10240): mental process; act of recognizing attributes of victim</a:t>
             </a:r>
           </a:p>
           <a:p>
             <a:r>
               <a:rPr lang="en-US" b="1" dirty="0"/>
-              <a:t>Cyber surveillance</a:t>
+              <a:t>Cyber surveillance </a:t>
             </a:r>
             <a:r>
               <a:rPr lang="en-US" dirty="0"/>
-              <a:t>: clandestine acquisition of confidential information about victim via online resources</a:t>
+              <a:t>(10241): clandestine acquisition of confidential information about victim via online resources</a:t>
             </a:r>
           </a:p>
           <a:p>
@@ -4089,7 +4101,7 @@
             </a:r>
             <a:r>
               <a:rPr lang="en-US" dirty="0"/>
-              <a:t>: act of conveying intentions about kidnapping to other members of criminal network</a:t>
+              <a:t> (10242): act of conveying intentions about kidnapping to other members of criminal network</a:t>
             </a:r>
           </a:p>
         </p:txBody>
@@ -4172,17 +4184,19 @@
         </p:nvSpPr>
         <p:spPr>
           <a:xfrm>
-            <a:off x="231033" y="204198"/>
-            <a:ext cx="3932237" cy="638764"/>
+            <a:off x="231033" y="583340"/>
+            <a:ext cx="3147787" cy="638764"/>
           </a:xfrm>
         </p:spPr>
         <p:txBody>
-          <a:bodyPr/>
+          <a:bodyPr>
+            <a:normAutofit fontScale="90000"/>
+          </a:bodyPr>
           <a:lstStyle/>
           <a:p>
             <a:r>
               <a:rPr lang="en-US" dirty="0"/>
-              <a:t>Committing crime</a:t>
+              <a:t>Committing crime (10222)</a:t>
             </a:r>
           </a:p>
         </p:txBody>
@@ -4217,27 +4231,35 @@
           <a:p>
             <a:r>
               <a:rPr lang="en-US" b="1" dirty="0"/>
-              <a:t>Motion traveling</a:t>
+              <a:t>Motion traveling </a:t>
             </a:r>
             <a:r>
               <a:rPr lang="en-US" dirty="0"/>
-              <a:t>: movement of kidnapper from a place to location where is planned</a:t>
+              <a:t>(10243): movement of kidnapper from a place to location where is planned</a:t>
             </a:r>
           </a:p>
           <a:p>
             <a:r>
               <a:rPr lang="en-US" b="1" dirty="0"/>
-              <a:t>Attack</a:t>
+              <a:t>Attack </a:t>
             </a:r>
             <a:r>
               <a:rPr lang="en-US" dirty="0"/>
-              <a:t>: control of victim by kidnapper</a:t>
+              <a:t>(10244): control of victim by kidnapper</a:t>
             </a:r>
           </a:p>
           <a:p>
             <a:r>
               <a:rPr lang="en-US" b="1" dirty="0"/>
-              <a:t>Kidnapping: </a:t>
+              <a:t>Kidnapping</a:t>
+            </a:r>
+            <a:r>
+              <a:rPr lang="en-US" dirty="0"/>
+              <a:t> (10245)</a:t>
+            </a:r>
+            <a:r>
+              <a:rPr lang="en-US" b="1" dirty="0"/>
+              <a:t>: </a:t>
             </a:r>
             <a:r>
               <a:rPr lang="en-US" dirty="0"/>
@@ -4251,47 +4273,47 @@
             </a:r>
             <a:r>
               <a:rPr lang="en-US" dirty="0"/>
-              <a:t>: process removing the victim from a location</a:t>
+              <a:t> (10246): process removing the victim from a location</a:t>
             </a:r>
           </a:p>
           <a:p>
             <a:r>
               <a:rPr lang="en-US" b="1" dirty="0"/>
-              <a:t>Placing victim</a:t>
+              <a:t>Placing victim </a:t>
             </a:r>
             <a:r>
               <a:rPr lang="en-US" dirty="0"/>
-              <a:t>: net movement of victim from one location to another</a:t>
+              <a:t>(10247): net movement of victim from one location to another</a:t>
             </a:r>
           </a:p>
           <a:p>
             <a:r>
               <a:rPr lang="en-US" b="1" dirty="0"/>
-              <a:t>Killing</a:t>
+              <a:t>Killing </a:t>
             </a:r>
             <a:r>
               <a:rPr lang="en-US" dirty="0"/>
-              <a:t>: death of victim as a result of action by kidnapper</a:t>
+              <a:t>(10254): death of victim as a result of action by kidnapper</a:t>
             </a:r>
           </a:p>
           <a:p>
             <a:r>
               <a:rPr lang="en-US" b="1" dirty="0"/>
-              <a:t>Temporary stay</a:t>
+              <a:t>Temporary stay </a:t>
             </a:r>
             <a:r>
               <a:rPr lang="en-US" dirty="0"/>
-              <a:t>: short stay of victim in safehouse or other location</a:t>
+              <a:t>(10250): short stay of victim in safehouse or other location</a:t>
             </a:r>
           </a:p>
           <a:p>
             <a:r>
               <a:rPr lang="en-US" b="1" dirty="0"/>
-              <a:t>Communication</a:t>
+              <a:t>Communication </a:t>
             </a:r>
             <a:r>
               <a:rPr lang="en-US" dirty="0"/>
-              <a:t>: act of conveying intended meanings from kidnapper to authorities or non-authorities</a:t>
+              <a:t>(10248): act of conveying intended meanings from kidnapper to authorities or non-authorities</a:t>
             </a:r>
           </a:p>
           <a:p>
@@ -4301,17 +4323,17 @@
             </a:r>
             <a:r>
               <a:rPr lang="en-US" dirty="0"/>
-              <a:t>: act of asking formally for something in return for safety of victim</a:t>
+              <a:t> (10249): act of asking formally for something in return for safety of victim</a:t>
             </a:r>
           </a:p>
           <a:p>
             <a:r>
               <a:rPr lang="en-US" b="1" dirty="0"/>
-              <a:t>Ransom</a:t>
+              <a:t>Ransom </a:t>
             </a:r>
             <a:r>
               <a:rPr lang="en-US" dirty="0"/>
-              <a:t>: practice of holding a prisoner or item to extort money or property</a:t>
+              <a:t>(10251): practice of holding a prisoner or item to extort money or property</a:t>
             </a:r>
           </a:p>
           <a:p>
@@ -4321,7 +4343,7 @@
             </a:r>
             <a:r>
               <a:rPr lang="en-US" dirty="0"/>
-              <a:t>: understanding between entities to follow a specific course of conduct</a:t>
+              <a:t> (10253): understanding between entities to follow a specific course of conduct</a:t>
             </a:r>
           </a:p>
           <a:p>
@@ -4330,8 +4352,12 @@
               <a:t>GiveUp</a:t>
             </a:r>
             <a:r>
+              <a:rPr lang="en-US" b="1" dirty="0"/>
+              <a:t> </a:t>
+            </a:r>
+            <a:r>
               <a:rPr lang="en-US" dirty="0"/>
-              <a:t>: form of surrender when kidnapper decides to stop crime</a:t>
+              <a:t>(10252): form of surrender when kidnapper decides to stop crime</a:t>
             </a:r>
           </a:p>
         </p:txBody>
@@ -4414,17 +4440,19 @@
         </p:nvSpPr>
         <p:spPr>
           <a:xfrm>
-            <a:off x="368299" y="171449"/>
-            <a:ext cx="3932237" cy="674687"/>
+            <a:off x="368299" y="314325"/>
+            <a:ext cx="4281760" cy="674687"/>
           </a:xfrm>
         </p:spPr>
         <p:txBody>
-          <a:bodyPr/>
+          <a:bodyPr>
+            <a:normAutofit fontScale="90000"/>
+          </a:bodyPr>
           <a:lstStyle/>
           <a:p>
             <a:r>
               <a:rPr lang="en-US" b="1" dirty="0"/>
-              <a:t>Authority response</a:t>
+              <a:t>Authority response (10223)</a:t>
             </a:r>
           </a:p>
         </p:txBody>
@@ -4447,8 +4475,8 @@
         </p:nvSpPr>
         <p:spPr>
           <a:xfrm>
-            <a:off x="436563" y="1031873"/>
-            <a:ext cx="3863973" cy="5511802"/>
+            <a:off x="211873" y="1031873"/>
+            <a:ext cx="4895386" cy="5511802"/>
           </a:xfrm>
         </p:spPr>
         <p:txBody>
@@ -4459,91 +4487,91 @@
           <a:p>
             <a:r>
               <a:rPr lang="en-US" sz="1200" b="1" dirty="0"/>
-              <a:t>Physical surveillance</a:t>
+              <a:t>Physical surveillance </a:t>
             </a:r>
             <a:r>
               <a:rPr lang="en-US" sz="1200" dirty="0"/>
-              <a:t>: monitoring of behavior, activities, or other changing information about kidnapper</a:t>
+              <a:t>(10255): monitoring of behavior, activities, or other changing information about kidnapper</a:t>
             </a:r>
           </a:p>
           <a:p>
             <a:r>
               <a:rPr lang="en-US" sz="1200" b="1" dirty="0"/>
-              <a:t>Traveling</a:t>
+              <a:t>Traveling </a:t>
             </a:r>
             <a:r>
               <a:rPr lang="en-US" sz="1200" dirty="0"/>
-              <a:t>: movement of authorities to location of kidnapper or victim</a:t>
+              <a:t>(10256): movement of authorities to location of kidnapper or victim</a:t>
             </a:r>
           </a:p>
           <a:p>
             <a:r>
               <a:rPr lang="en-US" sz="1200" b="1" dirty="0"/>
-              <a:t>Finding</a:t>
+              <a:t>Finding </a:t>
             </a:r>
             <a:r>
               <a:rPr lang="en-US" sz="1200" dirty="0"/>
-              <a:t>: physical finding of location of kidnapper or victim</a:t>
+              <a:t>(10257): physical finding of location of kidnapper or victim</a:t>
             </a:r>
           </a:p>
           <a:p>
             <a:r>
               <a:rPr lang="en-US" sz="1200" b="1" dirty="0"/>
-              <a:t>Communication</a:t>
+              <a:t>Communication </a:t>
             </a:r>
             <a:r>
               <a:rPr lang="en-US" sz="1200" dirty="0"/>
-              <a:t>: act of conveying intended meanings between authorities</a:t>
+              <a:t>(10258): act of conveying intended meanings between authorities</a:t>
             </a:r>
           </a:p>
           <a:p>
             <a:r>
               <a:rPr lang="en-US" sz="1200" b="1" dirty="0"/>
-              <a:t>Expressing publicly</a:t>
+              <a:t>Expressing publicly </a:t>
             </a:r>
             <a:r>
               <a:rPr lang="en-US" sz="1200" dirty="0"/>
-              <a:t>: revealing of restricted information about crime to public</a:t>
+              <a:t>(10259): revealing of restricted information about crime to public</a:t>
             </a:r>
           </a:p>
           <a:p>
             <a:r>
               <a:rPr lang="en-US" sz="1200" b="1" dirty="0"/>
-              <a:t>Request</a:t>
+              <a:t>Request </a:t>
             </a:r>
             <a:r>
               <a:rPr lang="en-US" sz="1200" dirty="0"/>
-              <a:t>: act of asking formally for demands of kidnapper</a:t>
+              <a:t>(10260): act of asking formally for demands of kidnapper</a:t>
             </a:r>
           </a:p>
           <a:p>
             <a:r>
               <a:rPr lang="en-US" sz="1200" b="1" dirty="0"/>
-              <a:t>Negotiation</a:t>
+              <a:t>Negotiation </a:t>
             </a:r>
             <a:r>
               <a:rPr lang="en-US" sz="1200" dirty="0"/>
-              <a:t>: meeting held between authorities and kidnapper</a:t>
+              <a:t>(10261): meeting held between authorities and kidnapper</a:t>
             </a:r>
           </a:p>
           <a:p>
             <a:r>
               <a:rPr lang="en-US" sz="1200" b="1" dirty="0"/>
-              <a:t>Influence</a:t>
+              <a:t>Influence </a:t>
             </a:r>
             <a:r>
               <a:rPr lang="en-US" sz="1200" dirty="0"/>
-              <a:t>:  umbrella term of influence and mode of communication</a:t>
+              <a:t>(10262): umbrella term of influence and mode of communication</a:t>
             </a:r>
           </a:p>
           <a:p>
             <a:r>
               <a:rPr lang="en-US" sz="1200" b="1" dirty="0"/>
-              <a:t>Helping</a:t>
+              <a:t>Helping </a:t>
             </a:r>
             <a:r>
               <a:rPr lang="en-US" sz="1200" dirty="0"/>
-              <a:t>: cooperation between authorities and people impacted by crime</a:t>
+              <a:t>(10265): cooperation between authorities and people impacted by crime</a:t>
             </a:r>
           </a:p>
           <a:p>
@@ -4553,7 +4581,7 @@
             </a:r>
             <a:r>
               <a:rPr lang="en-US" sz="1200" dirty="0"/>
-              <a:t>: act of protecting victim from attack</a:t>
+              <a:t> (10264): act of protecting victim from attack</a:t>
             </a:r>
           </a:p>
           <a:p>
@@ -4563,27 +4591,27 @@
             </a:r>
             <a:r>
               <a:rPr lang="en-US" sz="1200" dirty="0"/>
-              <a:t>: voluntary exchange of victim for other person or resource</a:t>
+              <a:t> (10268): voluntary exchange of victim for other person or resource</a:t>
             </a:r>
           </a:p>
           <a:p>
             <a:r>
               <a:rPr lang="en-US" sz="1200" b="1" dirty="0"/>
-              <a:t>Getting ransom</a:t>
+              <a:t>Getting ransom </a:t>
             </a:r>
             <a:r>
               <a:rPr lang="en-US" sz="1200" dirty="0"/>
-              <a:t>: money made available to secure safety of victim</a:t>
+              <a:t>(10263): money made available to secure safety of victim</a:t>
             </a:r>
           </a:p>
           <a:p>
             <a:r>
               <a:rPr lang="en-US" sz="1200" b="1" dirty="0"/>
-              <a:t>Attack</a:t>
+              <a:t>Attack </a:t>
             </a:r>
             <a:r>
               <a:rPr lang="en-US" sz="1200" dirty="0"/>
-              <a:t>: attempt to control situation by authorities</a:t>
+              <a:t>(10266): attempt to control situation by authorities</a:t>
             </a:r>
           </a:p>
           <a:p>
@@ -4593,7 +4621,7 @@
             </a:r>
             <a:r>
               <a:rPr lang="en-US" sz="1200" dirty="0"/>
-              <a:t>: act of killing the kidnapper or accidental killing of victim</a:t>
+              <a:t> (10267): act of killing the kidnapper or accidental killing of victim</a:t>
             </a:r>
           </a:p>
         </p:txBody>
@@ -4620,8 +4648,8 @@
         </p:blipFill>
         <p:spPr>
           <a:xfrm>
-            <a:off x="4318000" y="1397000"/>
-            <a:ext cx="7874000" cy="4064000"/>
+            <a:off x="5196468" y="1397000"/>
+            <a:ext cx="6995531" cy="4064000"/>
           </a:xfrm>
           <a:prstGeom prst="rect">
             <a:avLst/>
@@ -4688,7 +4716,7 @@
           <a:p>
             <a:r>
               <a:rPr lang="en-US" b="1" dirty="0"/>
-              <a:t>Non-authority response</a:t>
+              <a:t>Non-authority response (10224)</a:t>
             </a:r>
           </a:p>
         </p:txBody>
@@ -4712,7 +4740,7 @@
         <p:spPr>
           <a:xfrm>
             <a:off x="839788" y="2200275"/>
-            <a:ext cx="3517900" cy="3668713"/>
+            <a:ext cx="3910632" cy="3668713"/>
           </a:xfrm>
         </p:spPr>
         <p:txBody>
@@ -4721,11 +4749,11 @@
           <a:p>
             <a:r>
               <a:rPr lang="en-US" b="1" dirty="0"/>
-              <a:t>Negotiation</a:t>
+              <a:t>Negotiation </a:t>
             </a:r>
             <a:r>
               <a:rPr lang="en-US" dirty="0"/>
-              <a:t>: meeting held between non-authorities and kidnapper</a:t>
+              <a:t>(10269): meeting held between non-authorities and kidnapper</a:t>
             </a:r>
           </a:p>
           <a:p>
@@ -4735,7 +4763,7 @@
             </a:r>
             <a:r>
               <a:rPr lang="en-US" dirty="0"/>
-              <a:t>: conveying meaning between non-authorities and kidnapper</a:t>
+              <a:t> (10273): conveying meaning between non-authorities and kidnapper</a:t>
             </a:r>
           </a:p>
           <a:p>
@@ -4745,7 +4773,7 @@
             </a:r>
             <a:r>
               <a:rPr lang="en-US" dirty="0"/>
-              <a:t>: procuring money to secure safety of victim</a:t>
+              <a:t> (10270): procuring money to secure safety of victim</a:t>
             </a:r>
           </a:p>
           <a:p>
@@ -4755,7 +4783,7 @@
             </a:r>
             <a:r>
               <a:rPr lang="en-US" dirty="0"/>
-              <a:t>: movement of non-authorities to location for delivery of ransom</a:t>
+              <a:t> (10272): movement of non-authorities to location for delivery of ransom</a:t>
             </a:r>
           </a:p>
           <a:p>
@@ -4765,7 +4793,7 @@
             </a:r>
             <a:r>
               <a:rPr lang="en-US" dirty="0"/>
-              <a:t>: handing over ransom to kidnapper</a:t>
+              <a:t> (10271): handing over ransom to kidnapper</a:t>
             </a:r>
           </a:p>
         </p:txBody>
@@ -4846,14 +4874,19 @@
             <p:ph type="title"/>
           </p:nvPr>
         </p:nvSpPr>
-        <p:spPr/>
+        <p:spPr>
+          <a:xfrm>
+            <a:off x="839789" y="457200"/>
+            <a:ext cx="2594788" cy="1600200"/>
+          </a:xfrm>
+        </p:spPr>
         <p:txBody>
           <a:bodyPr/>
           <a:lstStyle/>
           <a:p>
             <a:r>
               <a:rPr lang="en-US" b="1" dirty="0"/>
-              <a:t>Legality</a:t>
+              <a:t>Legality (10225)</a:t>
             </a:r>
           </a:p>
         </p:txBody>
@@ -4890,7 +4923,7 @@
             </a:r>
             <a:r>
               <a:rPr lang="en-US" dirty="0"/>
-              <a:t>: investigation of crimes by police</a:t>
+              <a:t> (10274): investigation of crimes by police</a:t>
             </a:r>
           </a:p>
           <a:p>
@@ -4900,17 +4933,17 @@
             </a:r>
             <a:r>
               <a:rPr lang="en-US" dirty="0"/>
-              <a:t>: proceedings in any civil lawsuit or criminal prosecution</a:t>
+              <a:t> (10275): proceedings in any civil lawsuit or criminal prosecution</a:t>
             </a:r>
           </a:p>
           <a:p>
             <a:r>
               <a:rPr lang="en-US" b="1" dirty="0"/>
-              <a:t>Judgment communication</a:t>
+              <a:t>Judgment communication </a:t>
             </a:r>
             <a:r>
               <a:rPr lang="en-US" dirty="0"/>
-              <a:t>: instruction directed by law, judgment or administrative act to defendant or litigant to obey a certain behavior</a:t>
+              <a:t>(10276): instruction directed by law, judgment or administrative act to defendant or litigant to obey a certain behavior</a:t>
             </a:r>
           </a:p>
         </p:txBody>

</xml_diff>